<commit_message>
Removed old material and replaced new material for old material.
</commit_message>
<xml_diff>
--- a/Project2/webGL编程_添加注释版本.pptx
+++ b/Project2/webGL编程_添加注释版本.pptx
@@ -4947,7 +4947,7 @@
           </a:ln>
           <a:extLst>
             <a:ext uri="{C572A759-6A51-4108-AA02-DFA0A04FC94B}">
-              <ma14:wrappingTextBoxFlag xmlns="" xmlns:ma14="http://schemas.microsoft.com/office/mac/drawingml/2011/main" val="1"/>
+              <ma14:wrappingTextBoxFlag xmlns:ma14="http://schemas.microsoft.com/office/mac/drawingml/2011/main" xmlns="" val="1"/>
             </a:ext>
           </a:extLst>
         </p:spPr>
@@ -4998,7 +4998,7 @@
           </a:ln>
           <a:extLst>
             <a:ext uri="{C572A759-6A51-4108-AA02-DFA0A04FC94B}">
-              <ma14:wrappingTextBoxFlag xmlns="" xmlns:ma14="http://schemas.microsoft.com/office/mac/drawingml/2011/main" val="1"/>
+              <ma14:wrappingTextBoxFlag xmlns:ma14="http://schemas.microsoft.com/office/mac/drawingml/2011/main" xmlns="" val="1"/>
             </a:ext>
           </a:extLst>
         </p:spPr>
@@ -5578,7 +5578,47 @@
                   <a:srgbClr val="535353"/>
                 </a:solidFill>
               </a:rPr>
-              <a:t>2014-11-6</a:t>
+              <a:t>201</a:t>
+            </a:r>
+            <a:r>
+              <a:rPr lang="en-US" sz="3800" dirty="0" smtClean="0">
+                <a:solidFill>
+                  <a:srgbClr val="535353"/>
+                </a:solidFill>
+              </a:rPr>
+              <a:t>5</a:t>
+            </a:r>
+            <a:r>
+              <a:rPr sz="3800" dirty="0" smtClean="0">
+                <a:solidFill>
+                  <a:srgbClr val="535353"/>
+                </a:solidFill>
+              </a:rPr>
+              <a:t>-1</a:t>
+            </a:r>
+            <a:r>
+              <a:rPr lang="en-US" sz="3800" smtClean="0">
+                <a:solidFill>
+                  <a:srgbClr val="535353"/>
+                </a:solidFill>
+              </a:rPr>
+              <a:t>0</a:t>
+            </a:r>
+            <a:r>
+              <a:rPr sz="3800" smtClean="0">
+                <a:solidFill>
+                  <a:srgbClr val="535353"/>
+                </a:solidFill>
+              </a:rPr>
+              <a:t>-</a:t>
+            </a:r>
+            <a:r>
+              <a:rPr lang="en-US" sz="3800" smtClean="0">
+                <a:solidFill>
+                  <a:srgbClr val="535353"/>
+                </a:solidFill>
+              </a:rPr>
+              <a:t>22</a:t>
             </a:r>
             <a:endParaRPr sz="3800" dirty="0">
               <a:solidFill>

</xml_diff>